<commit_message>
update lecture notes, add quiz solutions
</commit_message>
<xml_diff>
--- a/lectures/ppt-art.pptx
+++ b/lectures/ppt-art.pptx
@@ -9,6 +9,7 @@
     <p:sldId id="257" r:id="rId3"/>
     <p:sldId id="258" r:id="rId4"/>
     <p:sldId id="259" r:id="rId5"/>
+    <p:sldId id="260" r:id="rId6"/>
   </p:sldIdLst>
   <p:sldSz cx="9144000" cy="6858000" type="screen4x3"/>
   <p:notesSz cx="6858000" cy="9144000"/>
@@ -291,7 +292,7 @@
           <a:p>
             <a:fld id="{8EA2CBBB-ED96-E243-BA0F-E5B447195E7E}" type="datetimeFigureOut">
               <a:rPr lang="en-US" smtClean="0"/>
-              <a:t>10/7/18</a:t>
+              <a:t>12/2/18</a:t>
             </a:fld>
             <a:endParaRPr lang="en-US"/>
           </a:p>
@@ -461,7 +462,7 @@
           <a:p>
             <a:fld id="{8EA2CBBB-ED96-E243-BA0F-E5B447195E7E}" type="datetimeFigureOut">
               <a:rPr lang="en-US" smtClean="0"/>
-              <a:t>10/7/18</a:t>
+              <a:t>12/2/18</a:t>
             </a:fld>
             <a:endParaRPr lang="en-US"/>
           </a:p>
@@ -641,7 +642,7 @@
           <a:p>
             <a:fld id="{8EA2CBBB-ED96-E243-BA0F-E5B447195E7E}" type="datetimeFigureOut">
               <a:rPr lang="en-US" smtClean="0"/>
-              <a:t>10/7/18</a:t>
+              <a:t>12/2/18</a:t>
             </a:fld>
             <a:endParaRPr lang="en-US"/>
           </a:p>
@@ -811,7 +812,7 @@
           <a:p>
             <a:fld id="{8EA2CBBB-ED96-E243-BA0F-E5B447195E7E}" type="datetimeFigureOut">
               <a:rPr lang="en-US" smtClean="0"/>
-              <a:t>10/7/18</a:t>
+              <a:t>12/2/18</a:t>
             </a:fld>
             <a:endParaRPr lang="en-US"/>
           </a:p>
@@ -1057,7 +1058,7 @@
           <a:p>
             <a:fld id="{8EA2CBBB-ED96-E243-BA0F-E5B447195E7E}" type="datetimeFigureOut">
               <a:rPr lang="en-US" smtClean="0"/>
-              <a:t>10/7/18</a:t>
+              <a:t>12/2/18</a:t>
             </a:fld>
             <a:endParaRPr lang="en-US"/>
           </a:p>
@@ -1345,7 +1346,7 @@
           <a:p>
             <a:fld id="{8EA2CBBB-ED96-E243-BA0F-E5B447195E7E}" type="datetimeFigureOut">
               <a:rPr lang="en-US" smtClean="0"/>
-              <a:t>10/7/18</a:t>
+              <a:t>12/2/18</a:t>
             </a:fld>
             <a:endParaRPr lang="en-US"/>
           </a:p>
@@ -1767,7 +1768,7 @@
           <a:p>
             <a:fld id="{8EA2CBBB-ED96-E243-BA0F-E5B447195E7E}" type="datetimeFigureOut">
               <a:rPr lang="en-US" smtClean="0"/>
-              <a:t>10/7/18</a:t>
+              <a:t>12/2/18</a:t>
             </a:fld>
             <a:endParaRPr lang="en-US"/>
           </a:p>
@@ -1885,7 +1886,7 @@
           <a:p>
             <a:fld id="{8EA2CBBB-ED96-E243-BA0F-E5B447195E7E}" type="datetimeFigureOut">
               <a:rPr lang="en-US" smtClean="0"/>
-              <a:t>10/7/18</a:t>
+              <a:t>12/2/18</a:t>
             </a:fld>
             <a:endParaRPr lang="en-US"/>
           </a:p>
@@ -1980,7 +1981,7 @@
           <a:p>
             <a:fld id="{8EA2CBBB-ED96-E243-BA0F-E5B447195E7E}" type="datetimeFigureOut">
               <a:rPr lang="en-US" smtClean="0"/>
-              <a:t>10/7/18</a:t>
+              <a:t>12/2/18</a:t>
             </a:fld>
             <a:endParaRPr lang="en-US"/>
           </a:p>
@@ -2257,7 +2258,7 @@
           <a:p>
             <a:fld id="{8EA2CBBB-ED96-E243-BA0F-E5B447195E7E}" type="datetimeFigureOut">
               <a:rPr lang="en-US" smtClean="0"/>
-              <a:t>10/7/18</a:t>
+              <a:t>12/2/18</a:t>
             </a:fld>
             <a:endParaRPr lang="en-US"/>
           </a:p>
@@ -2510,7 +2511,7 @@
           <a:p>
             <a:fld id="{8EA2CBBB-ED96-E243-BA0F-E5B447195E7E}" type="datetimeFigureOut">
               <a:rPr lang="en-US" smtClean="0"/>
-              <a:t>10/7/18</a:t>
+              <a:t>12/2/18</a:t>
             </a:fld>
             <a:endParaRPr lang="en-US"/>
           </a:p>
@@ -2723,7 +2724,7 @@
           <a:p>
             <a:fld id="{8EA2CBBB-ED96-E243-BA0F-E5B447195E7E}" type="datetimeFigureOut">
               <a:rPr lang="en-US" smtClean="0"/>
-              <a:t>10/7/18</a:t>
+              <a:t>12/2/18</a:t>
             </a:fld>
             <a:endParaRPr lang="en-US"/>
           </a:p>
@@ -4910,6 +4911,935 @@
     <p:extLst>
       <p:ext uri="{BB962C8B-B14F-4D97-AF65-F5344CB8AC3E}">
         <p14:creationId xmlns:p14="http://schemas.microsoft.com/office/powerpoint/2010/main" val="2500632584"/>
+      </p:ext>
+    </p:extLst>
+  </p:cSld>
+  <p:clrMapOvr>
+    <a:masterClrMapping/>
+  </p:clrMapOvr>
+</p:sld>
+</file>
+
+<file path=ppt/slides/slide5.xml><?xml version="1.0" encoding="utf-8"?>
+<p:sld xmlns:a="http://schemas.openxmlformats.org/drawingml/2006/main" xmlns:r="http://schemas.openxmlformats.org/officeDocument/2006/relationships" xmlns:p="http://schemas.openxmlformats.org/presentationml/2006/main">
+  <p:cSld>
+    <p:spTree>
+      <p:nvGrpSpPr>
+        <p:cNvPr id="1" name=""/>
+        <p:cNvGrpSpPr/>
+        <p:nvPr/>
+      </p:nvGrpSpPr>
+      <p:grpSpPr>
+        <a:xfrm>
+          <a:off x="0" y="0"/>
+          <a:ext cx="0" cy="0"/>
+          <a:chOff x="0" y="0"/>
+          <a:chExt cx="0" cy="0"/>
+        </a:xfrm>
+      </p:grpSpPr>
+      <p:sp>
+        <p:nvSpPr>
+          <p:cNvPr id="4" name="Oval 3"/>
+          <p:cNvSpPr/>
+          <p:nvPr/>
+        </p:nvSpPr>
+        <p:spPr>
+          <a:xfrm>
+            <a:off x="6723530" y="4168588"/>
+            <a:ext cx="522941" cy="2136588"/>
+          </a:xfrm>
+          <a:prstGeom prst="ellipse">
+            <a:avLst/>
+          </a:prstGeom>
+        </p:spPr>
+        <p:style>
+          <a:lnRef idx="1">
+            <a:schemeClr val="accent1"/>
+          </a:lnRef>
+          <a:fillRef idx="3">
+            <a:schemeClr val="accent1"/>
+          </a:fillRef>
+          <a:effectRef idx="2">
+            <a:schemeClr val="accent1"/>
+          </a:effectRef>
+          <a:fontRef idx="minor">
+            <a:schemeClr val="lt1"/>
+          </a:fontRef>
+        </p:style>
+        <p:txBody>
+          <a:bodyPr rtlCol="0" anchor="ctr"/>
+          <a:lstStyle/>
+          <a:p>
+            <a:pPr algn="ctr"/>
+            <a:endParaRPr lang="en-US"/>
+          </a:p>
+        </p:txBody>
+      </p:sp>
+      <p:sp>
+        <p:nvSpPr>
+          <p:cNvPr id="5" name="Oval 4"/>
+          <p:cNvSpPr/>
+          <p:nvPr/>
+        </p:nvSpPr>
+        <p:spPr>
+          <a:xfrm>
+            <a:off x="6875930" y="4320988"/>
+            <a:ext cx="522941" cy="2136588"/>
+          </a:xfrm>
+          <a:prstGeom prst="ellipse">
+            <a:avLst/>
+          </a:prstGeom>
+        </p:spPr>
+        <p:style>
+          <a:lnRef idx="1">
+            <a:schemeClr val="accent1"/>
+          </a:lnRef>
+          <a:fillRef idx="3">
+            <a:schemeClr val="accent1"/>
+          </a:fillRef>
+          <a:effectRef idx="2">
+            <a:schemeClr val="accent1"/>
+          </a:effectRef>
+          <a:fontRef idx="minor">
+            <a:schemeClr val="lt1"/>
+          </a:fontRef>
+        </p:style>
+        <p:txBody>
+          <a:bodyPr rtlCol="0" anchor="ctr"/>
+          <a:lstStyle/>
+          <a:p>
+            <a:pPr algn="ctr"/>
+            <a:endParaRPr lang="en-US"/>
+          </a:p>
+        </p:txBody>
+      </p:sp>
+      <p:sp>
+        <p:nvSpPr>
+          <p:cNvPr id="6" name="Oval 5"/>
+          <p:cNvSpPr/>
+          <p:nvPr/>
+        </p:nvSpPr>
+        <p:spPr>
+          <a:xfrm>
+            <a:off x="3352800" y="1661458"/>
+            <a:ext cx="522941" cy="508000"/>
+          </a:xfrm>
+          <a:prstGeom prst="ellipse">
+            <a:avLst/>
+          </a:prstGeom>
+        </p:spPr>
+        <p:style>
+          <a:lnRef idx="1">
+            <a:schemeClr val="accent1"/>
+          </a:lnRef>
+          <a:fillRef idx="3">
+            <a:schemeClr val="accent1"/>
+          </a:fillRef>
+          <a:effectRef idx="2">
+            <a:schemeClr val="accent1"/>
+          </a:effectRef>
+          <a:fontRef idx="minor">
+            <a:schemeClr val="lt1"/>
+          </a:fontRef>
+        </p:style>
+        <p:txBody>
+          <a:bodyPr rtlCol="0" anchor="ctr"/>
+          <a:lstStyle/>
+          <a:p>
+            <a:pPr algn="ctr"/>
+            <a:endParaRPr lang="en-US"/>
+          </a:p>
+        </p:txBody>
+      </p:sp>
+      <p:sp>
+        <p:nvSpPr>
+          <p:cNvPr id="7" name="Oval 6"/>
+          <p:cNvSpPr/>
+          <p:nvPr/>
+        </p:nvSpPr>
+        <p:spPr>
+          <a:xfrm>
+            <a:off x="1131047" y="1661458"/>
+            <a:ext cx="522941" cy="508000"/>
+          </a:xfrm>
+          <a:prstGeom prst="ellipse">
+            <a:avLst/>
+          </a:prstGeom>
+        </p:spPr>
+        <p:style>
+          <a:lnRef idx="1">
+            <a:schemeClr val="accent1"/>
+          </a:lnRef>
+          <a:fillRef idx="3">
+            <a:schemeClr val="accent1"/>
+          </a:fillRef>
+          <a:effectRef idx="2">
+            <a:schemeClr val="accent1"/>
+          </a:effectRef>
+          <a:fontRef idx="minor">
+            <a:schemeClr val="lt1"/>
+          </a:fontRef>
+        </p:style>
+        <p:txBody>
+          <a:bodyPr rtlCol="0" anchor="ctr"/>
+          <a:lstStyle/>
+          <a:p>
+            <a:pPr algn="ctr"/>
+            <a:endParaRPr lang="en-US"/>
+          </a:p>
+        </p:txBody>
+      </p:sp>
+      <p:sp>
+        <p:nvSpPr>
+          <p:cNvPr id="8" name="Oval 7"/>
+          <p:cNvSpPr/>
+          <p:nvPr/>
+        </p:nvSpPr>
+        <p:spPr>
+          <a:xfrm>
+            <a:off x="2172447" y="2441388"/>
+            <a:ext cx="522941" cy="508000"/>
+          </a:xfrm>
+          <a:prstGeom prst="ellipse">
+            <a:avLst/>
+          </a:prstGeom>
+        </p:spPr>
+        <p:style>
+          <a:lnRef idx="1">
+            <a:schemeClr val="accent1"/>
+          </a:lnRef>
+          <a:fillRef idx="3">
+            <a:schemeClr val="accent1"/>
+          </a:fillRef>
+          <a:effectRef idx="2">
+            <a:schemeClr val="accent1"/>
+          </a:effectRef>
+          <a:fontRef idx="minor">
+            <a:schemeClr val="lt1"/>
+          </a:fontRef>
+        </p:style>
+        <p:txBody>
+          <a:bodyPr rtlCol="0" anchor="ctr"/>
+          <a:lstStyle/>
+          <a:p>
+            <a:pPr algn="ctr"/>
+            <a:endParaRPr lang="en-US"/>
+          </a:p>
+        </p:txBody>
+      </p:sp>
+      <p:sp>
+        <p:nvSpPr>
+          <p:cNvPr id="9" name="Oval 8"/>
+          <p:cNvSpPr/>
+          <p:nvPr/>
+        </p:nvSpPr>
+        <p:spPr>
+          <a:xfrm>
+            <a:off x="2172447" y="1658470"/>
+            <a:ext cx="522941" cy="508000"/>
+          </a:xfrm>
+          <a:prstGeom prst="ellipse">
+            <a:avLst/>
+          </a:prstGeom>
+        </p:spPr>
+        <p:style>
+          <a:lnRef idx="1">
+            <a:schemeClr val="accent1"/>
+          </a:lnRef>
+          <a:fillRef idx="3">
+            <a:schemeClr val="accent1"/>
+          </a:fillRef>
+          <a:effectRef idx="2">
+            <a:schemeClr val="accent1"/>
+          </a:effectRef>
+          <a:fontRef idx="minor">
+            <a:schemeClr val="lt1"/>
+          </a:fontRef>
+        </p:style>
+        <p:txBody>
+          <a:bodyPr rtlCol="0" anchor="ctr"/>
+          <a:lstStyle/>
+          <a:p>
+            <a:pPr algn="ctr"/>
+            <a:endParaRPr lang="en-US"/>
+          </a:p>
+        </p:txBody>
+      </p:sp>
+      <p:sp>
+        <p:nvSpPr>
+          <p:cNvPr id="10" name="Oval 9"/>
+          <p:cNvSpPr/>
+          <p:nvPr/>
+        </p:nvSpPr>
+        <p:spPr>
+          <a:xfrm>
+            <a:off x="2172447" y="884517"/>
+            <a:ext cx="522941" cy="508000"/>
+          </a:xfrm>
+          <a:prstGeom prst="ellipse">
+            <a:avLst/>
+          </a:prstGeom>
+        </p:spPr>
+        <p:style>
+          <a:lnRef idx="1">
+            <a:schemeClr val="accent1"/>
+          </a:lnRef>
+          <a:fillRef idx="3">
+            <a:schemeClr val="accent1"/>
+          </a:fillRef>
+          <a:effectRef idx="2">
+            <a:schemeClr val="accent1"/>
+          </a:effectRef>
+          <a:fontRef idx="minor">
+            <a:schemeClr val="lt1"/>
+          </a:fontRef>
+        </p:style>
+        <p:txBody>
+          <a:bodyPr rtlCol="0" anchor="ctr"/>
+          <a:lstStyle/>
+          <a:p>
+            <a:pPr algn="ctr"/>
+            <a:endParaRPr lang="en-US"/>
+          </a:p>
+        </p:txBody>
+      </p:sp>
+      <p:cxnSp>
+        <p:nvCxnSpPr>
+          <p:cNvPr id="12" name="Straight Connector 11"/>
+          <p:cNvCxnSpPr>
+            <a:stCxn id="7" idx="7"/>
+            <a:endCxn id="10" idx="3"/>
+          </p:cNvCxnSpPr>
+          <p:nvPr/>
+        </p:nvCxnSpPr>
+        <p:spPr>
+          <a:xfrm flipV="1">
+            <a:off x="1577405" y="1318122"/>
+            <a:ext cx="671625" cy="417731"/>
+          </a:xfrm>
+          <a:prstGeom prst="line">
+            <a:avLst/>
+          </a:prstGeom>
+        </p:spPr>
+        <p:style>
+          <a:lnRef idx="2">
+            <a:schemeClr val="accent1"/>
+          </a:lnRef>
+          <a:fillRef idx="0">
+            <a:schemeClr val="accent1"/>
+          </a:fillRef>
+          <a:effectRef idx="1">
+            <a:schemeClr val="accent1"/>
+          </a:effectRef>
+          <a:fontRef idx="minor">
+            <a:schemeClr val="tx1"/>
+          </a:fontRef>
+        </p:style>
+      </p:cxnSp>
+      <p:cxnSp>
+        <p:nvCxnSpPr>
+          <p:cNvPr id="14" name="Straight Connector 13"/>
+          <p:cNvCxnSpPr>
+            <a:stCxn id="7" idx="6"/>
+            <a:endCxn id="9" idx="2"/>
+          </p:cNvCxnSpPr>
+          <p:nvPr/>
+        </p:nvCxnSpPr>
+        <p:spPr>
+          <a:xfrm flipV="1">
+            <a:off x="1653988" y="1912470"/>
+            <a:ext cx="518459" cy="2988"/>
+          </a:xfrm>
+          <a:prstGeom prst="line">
+            <a:avLst/>
+          </a:prstGeom>
+        </p:spPr>
+        <p:style>
+          <a:lnRef idx="2">
+            <a:schemeClr val="accent1"/>
+          </a:lnRef>
+          <a:fillRef idx="0">
+            <a:schemeClr val="accent1"/>
+          </a:fillRef>
+          <a:effectRef idx="1">
+            <a:schemeClr val="accent1"/>
+          </a:effectRef>
+          <a:fontRef idx="minor">
+            <a:schemeClr val="tx1"/>
+          </a:fontRef>
+        </p:style>
+      </p:cxnSp>
+      <p:cxnSp>
+        <p:nvCxnSpPr>
+          <p:cNvPr id="16" name="Straight Connector 15"/>
+          <p:cNvCxnSpPr>
+            <a:stCxn id="7" idx="5"/>
+            <a:endCxn id="8" idx="1"/>
+          </p:cNvCxnSpPr>
+          <p:nvPr/>
+        </p:nvCxnSpPr>
+        <p:spPr>
+          <a:xfrm>
+            <a:off x="1577405" y="2095063"/>
+            <a:ext cx="671625" cy="420720"/>
+          </a:xfrm>
+          <a:prstGeom prst="line">
+            <a:avLst/>
+          </a:prstGeom>
+        </p:spPr>
+        <p:style>
+          <a:lnRef idx="2">
+            <a:schemeClr val="accent1"/>
+          </a:lnRef>
+          <a:fillRef idx="0">
+            <a:schemeClr val="accent1"/>
+          </a:fillRef>
+          <a:effectRef idx="1">
+            <a:schemeClr val="accent1"/>
+          </a:effectRef>
+          <a:fontRef idx="minor">
+            <a:schemeClr val="tx1"/>
+          </a:fontRef>
+        </p:style>
+      </p:cxnSp>
+      <p:cxnSp>
+        <p:nvCxnSpPr>
+          <p:cNvPr id="18" name="Straight Connector 17"/>
+          <p:cNvCxnSpPr>
+            <a:stCxn id="8" idx="7"/>
+            <a:endCxn id="6" idx="3"/>
+          </p:cNvCxnSpPr>
+          <p:nvPr/>
+        </p:nvCxnSpPr>
+        <p:spPr>
+          <a:xfrm flipV="1">
+            <a:off x="2618805" y="2095063"/>
+            <a:ext cx="810578" cy="420720"/>
+          </a:xfrm>
+          <a:prstGeom prst="line">
+            <a:avLst/>
+          </a:prstGeom>
+        </p:spPr>
+        <p:style>
+          <a:lnRef idx="2">
+            <a:schemeClr val="accent1"/>
+          </a:lnRef>
+          <a:fillRef idx="0">
+            <a:schemeClr val="accent1"/>
+          </a:fillRef>
+          <a:effectRef idx="1">
+            <a:schemeClr val="accent1"/>
+          </a:effectRef>
+          <a:fontRef idx="minor">
+            <a:schemeClr val="tx1"/>
+          </a:fontRef>
+        </p:style>
+      </p:cxnSp>
+      <p:cxnSp>
+        <p:nvCxnSpPr>
+          <p:cNvPr id="20" name="Straight Connector 19"/>
+          <p:cNvCxnSpPr>
+            <a:stCxn id="9" idx="6"/>
+            <a:endCxn id="6" idx="2"/>
+          </p:cNvCxnSpPr>
+          <p:nvPr/>
+        </p:nvCxnSpPr>
+        <p:spPr>
+          <a:xfrm>
+            <a:off x="2695388" y="1912470"/>
+            <a:ext cx="657412" cy="2988"/>
+          </a:xfrm>
+          <a:prstGeom prst="line">
+            <a:avLst/>
+          </a:prstGeom>
+        </p:spPr>
+        <p:style>
+          <a:lnRef idx="2">
+            <a:schemeClr val="accent1"/>
+          </a:lnRef>
+          <a:fillRef idx="0">
+            <a:schemeClr val="accent1"/>
+          </a:fillRef>
+          <a:effectRef idx="1">
+            <a:schemeClr val="accent1"/>
+          </a:effectRef>
+          <a:fontRef idx="minor">
+            <a:schemeClr val="tx1"/>
+          </a:fontRef>
+        </p:style>
+      </p:cxnSp>
+      <p:cxnSp>
+        <p:nvCxnSpPr>
+          <p:cNvPr id="22" name="Straight Connector 21"/>
+          <p:cNvCxnSpPr>
+            <a:stCxn id="10" idx="6"/>
+            <a:endCxn id="6" idx="1"/>
+          </p:cNvCxnSpPr>
+          <p:nvPr/>
+        </p:nvCxnSpPr>
+        <p:spPr>
+          <a:xfrm>
+            <a:off x="2695388" y="1138517"/>
+            <a:ext cx="733995" cy="597336"/>
+          </a:xfrm>
+          <a:prstGeom prst="line">
+            <a:avLst/>
+          </a:prstGeom>
+        </p:spPr>
+        <p:style>
+          <a:lnRef idx="2">
+            <a:schemeClr val="accent1"/>
+          </a:lnRef>
+          <a:fillRef idx="0">
+            <a:schemeClr val="accent1"/>
+          </a:fillRef>
+          <a:effectRef idx="1">
+            <a:schemeClr val="accent1"/>
+          </a:effectRef>
+          <a:fontRef idx="minor">
+            <a:schemeClr val="tx1"/>
+          </a:fontRef>
+        </p:style>
+      </p:cxnSp>
+      <p:sp>
+        <p:nvSpPr>
+          <p:cNvPr id="23" name="TextBox 22"/>
+          <p:cNvSpPr txBox="1"/>
+          <p:nvPr/>
+        </p:nvSpPr>
+        <p:spPr>
+          <a:xfrm>
+            <a:off x="1229853" y="1685969"/>
+            <a:ext cx="287258" cy="369332"/>
+          </a:xfrm>
+          <a:prstGeom prst="rect">
+            <a:avLst/>
+          </a:prstGeom>
+          <a:noFill/>
+        </p:spPr>
+        <p:txBody>
+          <a:bodyPr wrap="none" rtlCol="0">
+            <a:spAutoFit/>
+          </a:bodyPr>
+          <a:lstStyle/>
+          <a:p>
+            <a:r>
+              <a:rPr lang="en-US" dirty="0" smtClean="0"/>
+              <a:t>x</a:t>
+            </a:r>
+            <a:endParaRPr lang="en-US" dirty="0"/>
+          </a:p>
+        </p:txBody>
+      </p:sp>
+      <p:sp>
+        <p:nvSpPr>
+          <p:cNvPr id="24" name="TextBox 23"/>
+          <p:cNvSpPr txBox="1"/>
+          <p:nvPr/>
+        </p:nvSpPr>
+        <p:spPr>
+          <a:xfrm>
+            <a:off x="3452376" y="1702378"/>
+            <a:ext cx="289149" cy="369332"/>
+          </a:xfrm>
+          <a:prstGeom prst="rect">
+            <a:avLst/>
+          </a:prstGeom>
+          <a:noFill/>
+        </p:spPr>
+        <p:txBody>
+          <a:bodyPr wrap="none" rtlCol="0">
+            <a:spAutoFit/>
+          </a:bodyPr>
+          <a:lstStyle/>
+          <a:p>
+            <a:r>
+              <a:rPr lang="en-US" dirty="0"/>
+              <a:t>y</a:t>
+            </a:r>
+          </a:p>
+        </p:txBody>
+      </p:sp>
+      <p:sp>
+        <p:nvSpPr>
+          <p:cNvPr id="25" name="TextBox 24"/>
+          <p:cNvSpPr txBox="1"/>
+          <p:nvPr/>
+        </p:nvSpPr>
+        <p:spPr>
+          <a:xfrm>
+            <a:off x="1527570" y="1207851"/>
+            <a:ext cx="583663" cy="369332"/>
+          </a:xfrm>
+          <a:prstGeom prst="rect">
+            <a:avLst/>
+          </a:prstGeom>
+          <a:noFill/>
+        </p:spPr>
+        <p:txBody>
+          <a:bodyPr wrap="none" rtlCol="0">
+            <a:spAutoFit/>
+          </a:bodyPr>
+          <a:lstStyle/>
+          <a:p>
+            <a:r>
+              <a:rPr lang="en-US" dirty="0" smtClean="0"/>
+              <a:t>w00</a:t>
+            </a:r>
+            <a:endParaRPr lang="en-US" dirty="0"/>
+          </a:p>
+        </p:txBody>
+      </p:sp>
+      <p:sp>
+        <p:nvSpPr>
+          <p:cNvPr id="26" name="TextBox 25"/>
+          <p:cNvSpPr txBox="1"/>
+          <p:nvPr/>
+        </p:nvSpPr>
+        <p:spPr>
+          <a:xfrm>
+            <a:off x="1669511" y="1658470"/>
+            <a:ext cx="583663" cy="369332"/>
+          </a:xfrm>
+          <a:prstGeom prst="rect">
+            <a:avLst/>
+          </a:prstGeom>
+          <a:noFill/>
+        </p:spPr>
+        <p:txBody>
+          <a:bodyPr wrap="none" rtlCol="0">
+            <a:spAutoFit/>
+          </a:bodyPr>
+          <a:lstStyle/>
+          <a:p>
+            <a:r>
+              <a:rPr lang="en-US" dirty="0" smtClean="0"/>
+              <a:t>w01</a:t>
+            </a:r>
+            <a:endParaRPr lang="en-US" dirty="0"/>
+          </a:p>
+        </p:txBody>
+      </p:sp>
+      <p:sp>
+        <p:nvSpPr>
+          <p:cNvPr id="27" name="TextBox 26"/>
+          <p:cNvSpPr txBox="1"/>
+          <p:nvPr/>
+        </p:nvSpPr>
+        <p:spPr>
+          <a:xfrm>
+            <a:off x="1517111" y="2312894"/>
+            <a:ext cx="583663" cy="369332"/>
+          </a:xfrm>
+          <a:prstGeom prst="rect">
+            <a:avLst/>
+          </a:prstGeom>
+          <a:noFill/>
+        </p:spPr>
+        <p:txBody>
+          <a:bodyPr wrap="none" rtlCol="0">
+            <a:spAutoFit/>
+          </a:bodyPr>
+          <a:lstStyle/>
+          <a:p>
+            <a:r>
+              <a:rPr lang="en-US" dirty="0" smtClean="0"/>
+              <a:t>w02</a:t>
+            </a:r>
+            <a:endParaRPr lang="en-US" dirty="0"/>
+          </a:p>
+        </p:txBody>
+      </p:sp>
+      <p:sp>
+        <p:nvSpPr>
+          <p:cNvPr id="28" name="TextBox 27"/>
+          <p:cNvSpPr txBox="1"/>
+          <p:nvPr/>
+        </p:nvSpPr>
+        <p:spPr>
+          <a:xfrm>
+            <a:off x="2868713" y="1153458"/>
+            <a:ext cx="583663" cy="369332"/>
+          </a:xfrm>
+          <a:prstGeom prst="rect">
+            <a:avLst/>
+          </a:prstGeom>
+          <a:noFill/>
+        </p:spPr>
+        <p:txBody>
+          <a:bodyPr wrap="none" rtlCol="0">
+            <a:spAutoFit/>
+          </a:bodyPr>
+          <a:lstStyle/>
+          <a:p>
+            <a:r>
+              <a:rPr lang="en-US" dirty="0" smtClean="0"/>
+              <a:t>w10</a:t>
+            </a:r>
+            <a:endParaRPr lang="en-US" dirty="0"/>
+          </a:p>
+        </p:txBody>
+      </p:sp>
+      <p:sp>
+        <p:nvSpPr>
+          <p:cNvPr id="29" name="TextBox 28"/>
+          <p:cNvSpPr txBox="1"/>
+          <p:nvPr/>
+        </p:nvSpPr>
+        <p:spPr>
+          <a:xfrm>
+            <a:off x="2695388" y="1599879"/>
+            <a:ext cx="583663" cy="369332"/>
+          </a:xfrm>
+          <a:prstGeom prst="rect">
+            <a:avLst/>
+          </a:prstGeom>
+          <a:noFill/>
+        </p:spPr>
+        <p:txBody>
+          <a:bodyPr wrap="none" rtlCol="0">
+            <a:spAutoFit/>
+          </a:bodyPr>
+          <a:lstStyle/>
+          <a:p>
+            <a:r>
+              <a:rPr lang="en-US" dirty="0" smtClean="0"/>
+              <a:t>w11</a:t>
+            </a:r>
+            <a:endParaRPr lang="en-US" dirty="0"/>
+          </a:p>
+        </p:txBody>
+      </p:sp>
+      <p:sp>
+        <p:nvSpPr>
+          <p:cNvPr id="30" name="TextBox 29"/>
+          <p:cNvSpPr txBox="1"/>
+          <p:nvPr/>
+        </p:nvSpPr>
+        <p:spPr>
+          <a:xfrm>
+            <a:off x="2695388" y="2146451"/>
+            <a:ext cx="583663" cy="369332"/>
+          </a:xfrm>
+          <a:prstGeom prst="rect">
+            <a:avLst/>
+          </a:prstGeom>
+          <a:noFill/>
+        </p:spPr>
+        <p:txBody>
+          <a:bodyPr wrap="none" rtlCol="0">
+            <a:spAutoFit/>
+          </a:bodyPr>
+          <a:lstStyle/>
+          <a:p>
+            <a:r>
+              <a:rPr lang="en-US" dirty="0" smtClean="0"/>
+              <a:t>w12</a:t>
+            </a:r>
+            <a:endParaRPr lang="en-US" dirty="0"/>
+          </a:p>
+        </p:txBody>
+      </p:sp>
+      <p:sp>
+        <p:nvSpPr>
+          <p:cNvPr id="32" name="TextBox 31"/>
+          <p:cNvSpPr txBox="1"/>
+          <p:nvPr/>
+        </p:nvSpPr>
+        <p:spPr>
+          <a:xfrm>
+            <a:off x="828226" y="3148995"/>
+            <a:ext cx="1470024" cy="369332"/>
+          </a:xfrm>
+          <a:prstGeom prst="rect">
+            <a:avLst/>
+          </a:prstGeom>
+          <a:noFill/>
+        </p:spPr>
+        <p:txBody>
+          <a:bodyPr wrap="none" rtlCol="0">
+            <a:spAutoFit/>
+          </a:bodyPr>
+          <a:lstStyle/>
+          <a:p>
+            <a:r>
+              <a:rPr lang="en-US" dirty="0"/>
+              <a:t>b</a:t>
+            </a:r>
+            <a:r>
+              <a:rPr lang="en-US" dirty="0" smtClean="0"/>
+              <a:t>01, b02, b03</a:t>
+            </a:r>
+            <a:endParaRPr lang="en-US" dirty="0"/>
+          </a:p>
+        </p:txBody>
+      </p:sp>
+      <p:sp>
+        <p:nvSpPr>
+          <p:cNvPr id="33" name="TextBox 32"/>
+          <p:cNvSpPr txBox="1"/>
+          <p:nvPr/>
+        </p:nvSpPr>
+        <p:spPr>
+          <a:xfrm>
+            <a:off x="2905810" y="3109546"/>
+            <a:ext cx="422937" cy="369332"/>
+          </a:xfrm>
+          <a:prstGeom prst="rect">
+            <a:avLst/>
+          </a:prstGeom>
+          <a:noFill/>
+        </p:spPr>
+        <p:txBody>
+          <a:bodyPr wrap="none" rtlCol="0">
+            <a:spAutoFit/>
+          </a:bodyPr>
+          <a:lstStyle/>
+          <a:p>
+            <a:r>
+              <a:rPr lang="en-US" dirty="0" smtClean="0"/>
+              <a:t>b1</a:t>
+            </a:r>
+            <a:endParaRPr lang="en-US" dirty="0"/>
+          </a:p>
+        </p:txBody>
+      </p:sp>
+      <p:cxnSp>
+        <p:nvCxnSpPr>
+          <p:cNvPr id="35" name="Straight Connector 34"/>
+          <p:cNvCxnSpPr>
+            <a:stCxn id="32" idx="0"/>
+            <a:endCxn id="10" idx="3"/>
+          </p:cNvCxnSpPr>
+          <p:nvPr/>
+        </p:nvCxnSpPr>
+        <p:spPr>
+          <a:xfrm flipV="1">
+            <a:off x="1563238" y="1318122"/>
+            <a:ext cx="685792" cy="1830873"/>
+          </a:xfrm>
+          <a:prstGeom prst="line">
+            <a:avLst/>
+          </a:prstGeom>
+        </p:spPr>
+        <p:style>
+          <a:lnRef idx="2">
+            <a:schemeClr val="accent1"/>
+          </a:lnRef>
+          <a:fillRef idx="0">
+            <a:schemeClr val="accent1"/>
+          </a:fillRef>
+          <a:effectRef idx="1">
+            <a:schemeClr val="accent1"/>
+          </a:effectRef>
+          <a:fontRef idx="minor">
+            <a:schemeClr val="tx1"/>
+          </a:fontRef>
+        </p:style>
+      </p:cxnSp>
+      <p:cxnSp>
+        <p:nvCxnSpPr>
+          <p:cNvPr id="36" name="Straight Connector 35"/>
+          <p:cNvCxnSpPr>
+            <a:stCxn id="32" idx="0"/>
+            <a:endCxn id="8" idx="2"/>
+          </p:cNvCxnSpPr>
+          <p:nvPr/>
+        </p:nvCxnSpPr>
+        <p:spPr>
+          <a:xfrm flipV="1">
+            <a:off x="1563238" y="2695388"/>
+            <a:ext cx="609209" cy="453607"/>
+          </a:xfrm>
+          <a:prstGeom prst="line">
+            <a:avLst/>
+          </a:prstGeom>
+        </p:spPr>
+        <p:style>
+          <a:lnRef idx="2">
+            <a:schemeClr val="accent1"/>
+          </a:lnRef>
+          <a:fillRef idx="0">
+            <a:schemeClr val="accent1"/>
+          </a:fillRef>
+          <a:effectRef idx="1">
+            <a:schemeClr val="accent1"/>
+          </a:effectRef>
+          <a:fontRef idx="minor">
+            <a:schemeClr val="tx1"/>
+          </a:fontRef>
+        </p:style>
+      </p:cxnSp>
+      <p:cxnSp>
+        <p:nvCxnSpPr>
+          <p:cNvPr id="37" name="Straight Connector 36"/>
+          <p:cNvCxnSpPr>
+            <a:stCxn id="32" idx="0"/>
+            <a:endCxn id="9" idx="3"/>
+          </p:cNvCxnSpPr>
+          <p:nvPr/>
+        </p:nvCxnSpPr>
+        <p:spPr>
+          <a:xfrm flipV="1">
+            <a:off x="1563238" y="2092075"/>
+            <a:ext cx="685792" cy="1056920"/>
+          </a:xfrm>
+          <a:prstGeom prst="line">
+            <a:avLst/>
+          </a:prstGeom>
+        </p:spPr>
+        <p:style>
+          <a:lnRef idx="2">
+            <a:schemeClr val="accent1"/>
+          </a:lnRef>
+          <a:fillRef idx="0">
+            <a:schemeClr val="accent1"/>
+          </a:fillRef>
+          <a:effectRef idx="1">
+            <a:schemeClr val="accent1"/>
+          </a:effectRef>
+          <a:fontRef idx="minor">
+            <a:schemeClr val="tx1"/>
+          </a:fontRef>
+        </p:style>
+      </p:cxnSp>
+      <p:cxnSp>
+        <p:nvCxnSpPr>
+          <p:cNvPr id="43" name="Straight Connector 42"/>
+          <p:cNvCxnSpPr>
+            <a:stCxn id="33" idx="0"/>
+            <a:endCxn id="6" idx="3"/>
+          </p:cNvCxnSpPr>
+          <p:nvPr/>
+        </p:nvCxnSpPr>
+        <p:spPr>
+          <a:xfrm flipV="1">
+            <a:off x="3117279" y="2095063"/>
+            <a:ext cx="312104" cy="1014483"/>
+          </a:xfrm>
+          <a:prstGeom prst="line">
+            <a:avLst/>
+          </a:prstGeom>
+        </p:spPr>
+        <p:style>
+          <a:lnRef idx="2">
+            <a:schemeClr val="accent1"/>
+          </a:lnRef>
+          <a:fillRef idx="0">
+            <a:schemeClr val="accent1"/>
+          </a:fillRef>
+          <a:effectRef idx="1">
+            <a:schemeClr val="accent1"/>
+          </a:effectRef>
+          <a:fontRef idx="minor">
+            <a:schemeClr val="tx1"/>
+          </a:fontRef>
+        </p:style>
+      </p:cxnSp>
+    </p:spTree>
+    <p:extLst>
+      <p:ext uri="{BB962C8B-B14F-4D97-AF65-F5344CB8AC3E}">
+        <p14:creationId xmlns:p14="http://schemas.microsoft.com/office/powerpoint/2010/main" val="866942176"/>
       </p:ext>
     </p:extLst>
   </p:cSld>

</xml_diff>